<commit_message>
Actualizar presentación de la asignatura
</commit_message>
<xml_diff>
--- a/presentacion/presentacion_asignatura.pptx
+++ b/presentacion/presentacion_asignatura.pptx
@@ -388,7 +388,7 @@
           <a:p>
             <a:fld id="{0E6DD734-ED03-654B-AB4F-7200E4D8D114}" type="datetimeFigureOut">
               <a:rPr lang="en-ES" smtClean="0"/>
-              <a:t>14/4/25</a:t>
+              <a:t>12/1/26</a:t>
             </a:fld>
             <a:endParaRPr lang="en-ES"/>
           </a:p>
@@ -558,7 +558,7 @@
           <a:p>
             <a:fld id="{0E6DD734-ED03-654B-AB4F-7200E4D8D114}" type="datetimeFigureOut">
               <a:rPr lang="en-ES" smtClean="0"/>
-              <a:t>14/4/25</a:t>
+              <a:t>12/1/26</a:t>
             </a:fld>
             <a:endParaRPr lang="en-ES"/>
           </a:p>
@@ -738,7 +738,7 @@
           <a:p>
             <a:fld id="{0E6DD734-ED03-654B-AB4F-7200E4D8D114}" type="datetimeFigureOut">
               <a:rPr lang="en-ES" smtClean="0"/>
-              <a:t>14/4/25</a:t>
+              <a:t>12/1/26</a:t>
             </a:fld>
             <a:endParaRPr lang="en-ES"/>
           </a:p>
@@ -908,7 +908,7 @@
           <a:p>
             <a:fld id="{0E6DD734-ED03-654B-AB4F-7200E4D8D114}" type="datetimeFigureOut">
               <a:rPr lang="en-ES" smtClean="0"/>
-              <a:t>14/4/25</a:t>
+              <a:t>12/1/26</a:t>
             </a:fld>
             <a:endParaRPr lang="en-ES"/>
           </a:p>
@@ -1154,7 +1154,7 @@
           <a:p>
             <a:fld id="{0E6DD734-ED03-654B-AB4F-7200E4D8D114}" type="datetimeFigureOut">
               <a:rPr lang="en-ES" smtClean="0"/>
-              <a:t>14/4/25</a:t>
+              <a:t>12/1/26</a:t>
             </a:fld>
             <a:endParaRPr lang="en-ES"/>
           </a:p>
@@ -1386,7 +1386,7 @@
           <a:p>
             <a:fld id="{0E6DD734-ED03-654B-AB4F-7200E4D8D114}" type="datetimeFigureOut">
               <a:rPr lang="en-ES" smtClean="0"/>
-              <a:t>14/4/25</a:t>
+              <a:t>12/1/26</a:t>
             </a:fld>
             <a:endParaRPr lang="en-ES"/>
           </a:p>
@@ -1753,7 +1753,7 @@
           <a:p>
             <a:fld id="{0E6DD734-ED03-654B-AB4F-7200E4D8D114}" type="datetimeFigureOut">
               <a:rPr lang="en-ES" smtClean="0"/>
-              <a:t>14/4/25</a:t>
+              <a:t>12/1/26</a:t>
             </a:fld>
             <a:endParaRPr lang="en-ES"/>
           </a:p>
@@ -1871,7 +1871,7 @@
           <a:p>
             <a:fld id="{0E6DD734-ED03-654B-AB4F-7200E4D8D114}" type="datetimeFigureOut">
               <a:rPr lang="en-ES" smtClean="0"/>
-              <a:t>14/4/25</a:t>
+              <a:t>12/1/26</a:t>
             </a:fld>
             <a:endParaRPr lang="en-ES"/>
           </a:p>
@@ -1966,7 +1966,7 @@
           <a:p>
             <a:fld id="{0E6DD734-ED03-654B-AB4F-7200E4D8D114}" type="datetimeFigureOut">
               <a:rPr lang="en-ES" smtClean="0"/>
-              <a:t>14/4/25</a:t>
+              <a:t>12/1/26</a:t>
             </a:fld>
             <a:endParaRPr lang="en-ES"/>
           </a:p>
@@ -2243,7 +2243,7 @@
           <a:p>
             <a:fld id="{0E6DD734-ED03-654B-AB4F-7200E4D8D114}" type="datetimeFigureOut">
               <a:rPr lang="en-ES" smtClean="0"/>
-              <a:t>14/4/25</a:t>
+              <a:t>12/1/26</a:t>
             </a:fld>
             <a:endParaRPr lang="en-ES"/>
           </a:p>
@@ -2500,7 +2500,7 @@
           <a:p>
             <a:fld id="{0E6DD734-ED03-654B-AB4F-7200E4D8D114}" type="datetimeFigureOut">
               <a:rPr lang="en-ES" smtClean="0"/>
-              <a:t>14/4/25</a:t>
+              <a:t>12/1/26</a:t>
             </a:fld>
             <a:endParaRPr lang="en-ES"/>
           </a:p>
@@ -2713,7 +2713,7 @@
           <a:p>
             <a:fld id="{0E6DD734-ED03-654B-AB4F-7200E4D8D114}" type="datetimeFigureOut">
               <a:rPr lang="en-ES" smtClean="0"/>
-              <a:t>14/4/25</a:t>
+              <a:t>12/1/26</a:t>
             </a:fld>
             <a:endParaRPr lang="en-ES"/>
           </a:p>
@@ -3242,7 +3242,7 @@
             <a:pPr algn="ctr"/>
             <a:r>
               <a:rPr lang="en-ES" sz="1500" dirty="0"/>
-              <a:t>Curso 2024-2025</a:t>
+              <a:t>Curso 2025-2026</a:t>
             </a:r>
           </a:p>
         </p:txBody>
@@ -3311,15 +3311,12 @@
                 <a:latin typeface="Arial" panose="020B0604020202020204" pitchFamily="34" charset="0"/>
                 <a:cs typeface="Arial" panose="020B0604020202020204" pitchFamily="34" charset="0"/>
               </a:rPr>
-              <a:t>Objetivos de la asignatura </a:t>
-            </a:r>
-            <a:r>
-              <a:rPr lang="en-ES" sz="1000" b="1" dirty="0">
-                <a:latin typeface="Arial" panose="020B0604020202020204" pitchFamily="34" charset="0"/>
-                <a:cs typeface="Arial" panose="020B0604020202020204" pitchFamily="34" charset="0"/>
-              </a:rPr>
-              <a:t>(no están en la guía docente)</a:t>
-            </a:r>
+              <a:t>Objetivos de la asignatura</a:t>
+            </a:r>
+            <a:endParaRPr lang="en-ES" sz="1000" b="1" dirty="0">
+              <a:latin typeface="Arial" panose="020B0604020202020204" pitchFamily="34" charset="0"/>
+              <a:cs typeface="Arial" panose="020B0604020202020204" pitchFamily="34" charset="0"/>
+            </a:endParaRPr>
           </a:p>
         </p:txBody>
       </p:sp>
@@ -3752,15 +3749,12 @@
                 <a:latin typeface="Arial" panose="020B0604020202020204" pitchFamily="34" charset="0"/>
                 <a:cs typeface="Arial" panose="020B0604020202020204" pitchFamily="34" charset="0"/>
               </a:rPr>
-              <a:t>Objetivos de la asignatura </a:t>
-            </a:r>
-            <a:r>
-              <a:rPr lang="en-ES" sz="1000" b="1" dirty="0">
-                <a:latin typeface="Arial" panose="020B0604020202020204" pitchFamily="34" charset="0"/>
-                <a:cs typeface="Arial" panose="020B0604020202020204" pitchFamily="34" charset="0"/>
-              </a:rPr>
-              <a:t>(no están en la guía docente)</a:t>
-            </a:r>
+              <a:t>Objetivos de la asignatura</a:t>
+            </a:r>
+            <a:endParaRPr lang="en-ES" sz="1000" b="1" dirty="0">
+              <a:latin typeface="Arial" panose="020B0604020202020204" pitchFamily="34" charset="0"/>
+              <a:cs typeface="Arial" panose="020B0604020202020204" pitchFamily="34" charset="0"/>
+            </a:endParaRPr>
           </a:p>
         </p:txBody>
       </p:sp>
@@ -4219,265 +4213,6 @@
       </p:grpSp>
       <p:grpSp>
         <p:nvGrpSpPr>
-          <p:cNvPr id="3" name="Group 2">
-            <a:extLst>
-              <a:ext uri="{FF2B5EF4-FFF2-40B4-BE49-F238E27FC236}">
-                <a16:creationId xmlns:a16="http://schemas.microsoft.com/office/drawing/2014/main" id="{565080CC-014D-4C8E-1265-6A7491F6B821}"/>
-              </a:ext>
-            </a:extLst>
-          </p:cNvPr>
-          <p:cNvGrpSpPr/>
-          <p:nvPr/>
-        </p:nvGrpSpPr>
-        <p:grpSpPr>
-          <a:xfrm>
-            <a:off x="541538" y="3315814"/>
-            <a:ext cx="2815173" cy="1438182"/>
-            <a:chOff x="541538" y="3315814"/>
-            <a:chExt cx="2815173" cy="1438182"/>
-          </a:xfrm>
-        </p:grpSpPr>
-        <p:pic>
-          <p:nvPicPr>
-            <p:cNvPr id="14" name="Picture 13" descr="A person with glasses and mustache&#10;&#10;Description automatically generated">
-              <a:extLst>
-                <a:ext uri="{FF2B5EF4-FFF2-40B4-BE49-F238E27FC236}">
-                  <a16:creationId xmlns:a16="http://schemas.microsoft.com/office/drawing/2014/main" id="{F21F80E2-DEA1-95CD-9B10-EF7776D4423A}"/>
-                </a:ext>
-              </a:extLst>
-            </p:cNvPr>
-            <p:cNvPicPr>
-              <a:picLocks noChangeAspect="1"/>
-            </p:cNvPicPr>
-            <p:nvPr/>
-          </p:nvPicPr>
-          <p:blipFill>
-            <a:blip r:embed="rId4"/>
-            <a:srcRect l="-1" t="9020" r="4372" b="14343"/>
-            <a:stretch/>
-          </p:blipFill>
-          <p:spPr>
-            <a:xfrm>
-              <a:off x="677876" y="3460090"/>
-              <a:ext cx="928429" cy="1137635"/>
-            </a:xfrm>
-            <a:prstGeom prst="rect">
-              <a:avLst/>
-            </a:prstGeom>
-          </p:spPr>
-        </p:pic>
-        <p:sp>
-          <p:nvSpPr>
-            <p:cNvPr id="15" name="Google Shape;253;p6">
-              <a:extLst>
-                <a:ext uri="{FF2B5EF4-FFF2-40B4-BE49-F238E27FC236}">
-                  <a16:creationId xmlns:a16="http://schemas.microsoft.com/office/drawing/2014/main" id="{B6A2B859-616F-FD55-2CFC-9DE5360BC30A}"/>
-                </a:ext>
-              </a:extLst>
-            </p:cNvPr>
-            <p:cNvSpPr txBox="1"/>
-            <p:nvPr/>
-          </p:nvSpPr>
-          <p:spPr>
-            <a:xfrm>
-              <a:off x="1721072" y="3503955"/>
-              <a:ext cx="1635639" cy="875240"/>
-            </a:xfrm>
-            <a:prstGeom prst="rect">
-              <a:avLst/>
-            </a:prstGeom>
-            <a:noFill/>
-            <a:ln>
-              <a:noFill/>
-            </a:ln>
-          </p:spPr>
-          <p:txBody>
-            <a:bodyPr spcFirstLastPara="1" wrap="square" lIns="74283" tIns="37131" rIns="74283" bIns="37131" anchor="t" anchorCtr="0">
-              <a:noAutofit/>
-            </a:bodyPr>
-            <a:lstStyle/>
-            <a:p>
-              <a:pPr>
-                <a:buClr>
-                  <a:srgbClr val="000000"/>
-                </a:buClr>
-                <a:buSzPts val="1200"/>
-              </a:pPr>
-              <a:r>
-                <a:rPr lang="es-ES" sz="975" dirty="0">
-                  <a:solidFill>
-                    <a:srgbClr val="000000"/>
-                  </a:solidFill>
-                  <a:latin typeface="Arial"/>
-                  <a:ea typeface="Arial"/>
-                  <a:cs typeface="Arial"/>
-                  <a:sym typeface="Arial"/>
-                </a:rPr>
-                <a:t>Miquel </a:t>
-              </a:r>
-              <a:r>
-                <a:rPr lang="es-ES" sz="975" dirty="0" err="1">
-                  <a:solidFill>
-                    <a:srgbClr val="000000"/>
-                  </a:solidFill>
-                  <a:latin typeface="Arial"/>
-                  <a:ea typeface="Arial"/>
-                  <a:cs typeface="Arial"/>
-                  <a:sym typeface="Arial"/>
-                </a:rPr>
-                <a:t>Gaju</a:t>
-              </a:r>
-              <a:r>
-                <a:rPr lang="es-ES" sz="975" dirty="0">
-                  <a:solidFill>
-                    <a:srgbClr val="000000"/>
-                  </a:solidFill>
-                  <a:latin typeface="Arial"/>
-                  <a:ea typeface="Arial"/>
-                  <a:cs typeface="Arial"/>
-                  <a:sym typeface="Arial"/>
-                </a:rPr>
-                <a:t> Ricart </a:t>
-              </a:r>
-            </a:p>
-            <a:p>
-              <a:pPr>
-                <a:buClr>
-                  <a:srgbClr val="000000"/>
-                </a:buClr>
-                <a:buSzPts val="1200"/>
-              </a:pPr>
-              <a:r>
-                <a:rPr lang="es-ES" sz="975" dirty="0">
-                  <a:solidFill>
-                    <a:srgbClr val="000000"/>
-                  </a:solidFill>
-                  <a:latin typeface="Arial"/>
-                  <a:ea typeface="Arial"/>
-                  <a:cs typeface="Arial"/>
-                  <a:sym typeface="Arial"/>
-                </a:rPr>
-                <a:t>Departamento de Zoología.</a:t>
-              </a:r>
-            </a:p>
-            <a:p>
-              <a:pPr>
-                <a:buClr>
-                  <a:srgbClr val="000000"/>
-                </a:buClr>
-                <a:buSzPts val="1200"/>
-              </a:pPr>
-              <a:r>
-                <a:rPr lang="es-ES" sz="975" dirty="0">
-                  <a:solidFill>
-                    <a:schemeClr val="dk1"/>
-                  </a:solidFill>
-                  <a:latin typeface="Arial"/>
-                  <a:ea typeface="Arial"/>
-                  <a:cs typeface="Arial"/>
-                  <a:sym typeface="Arial"/>
-                </a:rPr>
-                <a:t>Universidad de Córdoba.</a:t>
-              </a:r>
-              <a:endParaRPr sz="975" dirty="0">
-                <a:solidFill>
-                  <a:schemeClr val="dk1"/>
-                </a:solidFill>
-                <a:latin typeface="Arial"/>
-                <a:ea typeface="Arial"/>
-                <a:cs typeface="Arial"/>
-                <a:sym typeface="Arial"/>
-              </a:endParaRPr>
-            </a:p>
-            <a:p>
-              <a:pPr>
-                <a:buClr>
-                  <a:schemeClr val="dk1"/>
-                </a:buClr>
-                <a:buSzPts val="1200"/>
-              </a:pPr>
-              <a:r>
-                <a:rPr lang="es-ES" sz="975" u="sng" dirty="0">
-                  <a:solidFill>
-                    <a:schemeClr val="hlink"/>
-                  </a:solidFill>
-                  <a:latin typeface="Arial"/>
-                  <a:ea typeface="Arial"/>
-                  <a:cs typeface="Arial"/>
-                  <a:sym typeface="Arial"/>
-                </a:rPr>
-                <a:t>ba1garim@uco.es </a:t>
-              </a:r>
-            </a:p>
-            <a:p>
-              <a:pPr>
-                <a:buClr>
-                  <a:schemeClr val="dk1"/>
-                </a:buClr>
-                <a:buSzPts val="1200"/>
-              </a:pPr>
-              <a:endParaRPr sz="975" dirty="0">
-                <a:solidFill>
-                  <a:schemeClr val="dk1"/>
-                </a:solidFill>
-                <a:latin typeface="Arial"/>
-                <a:ea typeface="Arial"/>
-                <a:cs typeface="Arial"/>
-                <a:sym typeface="Arial"/>
-              </a:endParaRPr>
-            </a:p>
-          </p:txBody>
-        </p:sp>
-        <p:sp>
-          <p:nvSpPr>
-            <p:cNvPr id="18" name="Rectangle 17">
-              <a:extLst>
-                <a:ext uri="{FF2B5EF4-FFF2-40B4-BE49-F238E27FC236}">
-                  <a16:creationId xmlns:a16="http://schemas.microsoft.com/office/drawing/2014/main" id="{F918A96F-63EF-B5E4-AFC7-F9C694E5CE8B}"/>
-                </a:ext>
-              </a:extLst>
-            </p:cNvPr>
-            <p:cNvSpPr/>
-            <p:nvPr/>
-          </p:nvSpPr>
-          <p:spPr>
-            <a:xfrm>
-              <a:off x="541538" y="3315814"/>
-              <a:ext cx="2815173" cy="1438182"/>
-            </a:xfrm>
-            <a:prstGeom prst="rect">
-              <a:avLst/>
-            </a:prstGeom>
-            <a:noFill/>
-          </p:spPr>
-          <p:style>
-            <a:lnRef idx="2">
-              <a:schemeClr val="accent1">
-                <a:shade val="15000"/>
-              </a:schemeClr>
-            </a:lnRef>
-            <a:fillRef idx="1">
-              <a:schemeClr val="accent1"/>
-            </a:fillRef>
-            <a:effectRef idx="0">
-              <a:schemeClr val="accent1"/>
-            </a:effectRef>
-            <a:fontRef idx="minor">
-              <a:schemeClr val="lt1"/>
-            </a:fontRef>
-          </p:style>
-          <p:txBody>
-            <a:bodyPr rtlCol="0" anchor="ctr"/>
-            <a:lstStyle/>
-            <a:p>
-              <a:pPr algn="ctr"/>
-              <a:endParaRPr lang="en-ES"/>
-            </a:p>
-          </p:txBody>
-        </p:sp>
-      </p:grpSp>
-      <p:grpSp>
-        <p:nvGrpSpPr>
           <p:cNvPr id="5" name="Group 4">
             <a:extLst>
               <a:ext uri="{FF2B5EF4-FFF2-40B4-BE49-F238E27FC236}">
@@ -4511,7 +4246,7 @@
             <p:nvPr/>
           </p:nvPicPr>
           <p:blipFill rotWithShape="1">
-            <a:blip r:embed="rId5">
+            <a:blip r:embed="rId4">
               <a:extLst>
                 <a:ext uri="{28A0092B-C50C-407E-A947-70E740481C1C}">
                   <a14:useLocalDpi xmlns:a14="http://schemas.microsoft.com/office/drawing/2010/main" val="0"/>
@@ -4924,7 +4659,7 @@
                 <a:latin typeface="Arial" panose="020B0604020202020204" pitchFamily="34" charset="0"/>
                 <a:cs typeface="Arial" panose="020B0604020202020204" pitchFamily="34" charset="0"/>
               </a:rPr>
-              <a:t>Casos de estudio sobre invasiones en nuestro territorio.</a:t>
+              <a:t>Ejemplos de invasiones según los conceptos del bloque anterior</a:t>
             </a:r>
           </a:p>
         </p:txBody>
@@ -5058,6 +4793,270 @@
           </a:p>
         </p:txBody>
       </p:sp>
+      <p:grpSp>
+        <p:nvGrpSpPr>
+          <p:cNvPr id="6" name="Group 5">
+            <a:extLst>
+              <a:ext uri="{FF2B5EF4-FFF2-40B4-BE49-F238E27FC236}">
+                <a16:creationId xmlns:a16="http://schemas.microsoft.com/office/drawing/2014/main" id="{E46A9334-5834-D5AF-B4CC-E12361A42B85}"/>
+              </a:ext>
+            </a:extLst>
+          </p:cNvPr>
+          <p:cNvGrpSpPr/>
+          <p:nvPr/>
+        </p:nvGrpSpPr>
+        <p:grpSpPr>
+          <a:xfrm>
+            <a:off x="533220" y="3315814"/>
+            <a:ext cx="2823491" cy="1438182"/>
+            <a:chOff x="533220" y="3315814"/>
+            <a:chExt cx="2823491" cy="1438182"/>
+          </a:xfrm>
+        </p:grpSpPr>
+        <p:grpSp>
+          <p:nvGrpSpPr>
+            <p:cNvPr id="3" name="Group 2">
+              <a:extLst>
+                <a:ext uri="{FF2B5EF4-FFF2-40B4-BE49-F238E27FC236}">
+                  <a16:creationId xmlns:a16="http://schemas.microsoft.com/office/drawing/2014/main" id="{565080CC-014D-4C8E-1265-6A7491F6B821}"/>
+                </a:ext>
+              </a:extLst>
+            </p:cNvPr>
+            <p:cNvGrpSpPr/>
+            <p:nvPr/>
+          </p:nvGrpSpPr>
+          <p:grpSpPr>
+            <a:xfrm>
+              <a:off x="541538" y="3315814"/>
+              <a:ext cx="2815173" cy="1438182"/>
+              <a:chOff x="541538" y="3315814"/>
+              <a:chExt cx="2815173" cy="1438182"/>
+            </a:xfrm>
+          </p:grpSpPr>
+          <p:sp>
+            <p:nvSpPr>
+              <p:cNvPr id="15" name="Google Shape;253;p6">
+                <a:extLst>
+                  <a:ext uri="{FF2B5EF4-FFF2-40B4-BE49-F238E27FC236}">
+                    <a16:creationId xmlns:a16="http://schemas.microsoft.com/office/drawing/2014/main" id="{B6A2B859-616F-FD55-2CFC-9DE5360BC30A}"/>
+                  </a:ext>
+                </a:extLst>
+              </p:cNvPr>
+              <p:cNvSpPr txBox="1"/>
+              <p:nvPr/>
+            </p:nvSpPr>
+            <p:spPr>
+              <a:xfrm>
+                <a:off x="1721072" y="3503955"/>
+                <a:ext cx="1635639" cy="875240"/>
+              </a:xfrm>
+              <a:prstGeom prst="rect">
+                <a:avLst/>
+              </a:prstGeom>
+              <a:noFill/>
+              <a:ln>
+                <a:noFill/>
+              </a:ln>
+            </p:spPr>
+            <p:txBody>
+              <a:bodyPr spcFirstLastPara="1" wrap="square" lIns="74283" tIns="37131" rIns="74283" bIns="37131" anchor="t" anchorCtr="0">
+                <a:noAutofit/>
+              </a:bodyPr>
+              <a:lstStyle/>
+              <a:p>
+                <a:pPr>
+                  <a:buClr>
+                    <a:srgbClr val="000000"/>
+                  </a:buClr>
+                  <a:buSzPts val="1200"/>
+                </a:pPr>
+                <a:r>
+                  <a:rPr lang="es-ES" sz="975" dirty="0">
+                    <a:solidFill>
+                      <a:srgbClr val="000000"/>
+                    </a:solidFill>
+                    <a:latin typeface="Arial"/>
+                    <a:ea typeface="Arial"/>
+                    <a:cs typeface="Arial"/>
+                    <a:sym typeface="Arial"/>
+                  </a:rPr>
+                  <a:t>Jaime A. Muriel Redondo</a:t>
+                </a:r>
+              </a:p>
+              <a:p>
+                <a:pPr>
+                  <a:buClr>
+                    <a:srgbClr val="000000"/>
+                  </a:buClr>
+                  <a:buSzPts val="1200"/>
+                </a:pPr>
+                <a:r>
+                  <a:rPr lang="es-ES" sz="975" dirty="0">
+                    <a:solidFill>
+                      <a:srgbClr val="000000"/>
+                    </a:solidFill>
+                    <a:latin typeface="Arial"/>
+                    <a:ea typeface="Arial"/>
+                    <a:cs typeface="Arial"/>
+                    <a:sym typeface="Arial"/>
+                  </a:rPr>
+                  <a:t>Departamento de Zoología.</a:t>
+                </a:r>
+              </a:p>
+              <a:p>
+                <a:pPr>
+                  <a:buClr>
+                    <a:srgbClr val="000000"/>
+                  </a:buClr>
+                  <a:buSzPts val="1200"/>
+                </a:pPr>
+                <a:r>
+                  <a:rPr lang="es-ES" sz="975" dirty="0">
+                    <a:solidFill>
+                      <a:schemeClr val="dk1"/>
+                    </a:solidFill>
+                    <a:latin typeface="Arial"/>
+                    <a:ea typeface="Arial"/>
+                    <a:cs typeface="Arial"/>
+                    <a:sym typeface="Arial"/>
+                  </a:rPr>
+                  <a:t>Universidad de Córdoba.</a:t>
+                </a:r>
+                <a:endParaRPr sz="975" dirty="0">
+                  <a:solidFill>
+                    <a:schemeClr val="dk1"/>
+                  </a:solidFill>
+                  <a:latin typeface="Arial"/>
+                  <a:ea typeface="Arial"/>
+                  <a:cs typeface="Arial"/>
+                  <a:sym typeface="Arial"/>
+                </a:endParaRPr>
+              </a:p>
+              <a:p>
+                <a:pPr>
+                  <a:buClr>
+                    <a:schemeClr val="dk1"/>
+                  </a:buClr>
+                  <a:buSzPts val="1200"/>
+                </a:pPr>
+                <a:r>
+                  <a:rPr lang="en-GB" sz="1000" dirty="0">
+                    <a:hlinkClick r:id="rId5"/>
+                  </a:rPr>
+                  <a:t>b02murej@uco.es</a:t>
+                </a:r>
+                <a:r>
+                  <a:rPr lang="en-GB" sz="1000" dirty="0"/>
+                  <a:t> </a:t>
+                </a:r>
+                <a:endParaRPr sz="975" dirty="0">
+                  <a:solidFill>
+                    <a:schemeClr val="dk1"/>
+                  </a:solidFill>
+                  <a:latin typeface="Arial"/>
+                  <a:ea typeface="Arial"/>
+                  <a:cs typeface="Arial"/>
+                  <a:sym typeface="Arial"/>
+                </a:endParaRPr>
+              </a:p>
+            </p:txBody>
+          </p:sp>
+          <p:sp>
+            <p:nvSpPr>
+              <p:cNvPr id="18" name="Rectangle 17">
+                <a:extLst>
+                  <a:ext uri="{FF2B5EF4-FFF2-40B4-BE49-F238E27FC236}">
+                    <a16:creationId xmlns:a16="http://schemas.microsoft.com/office/drawing/2014/main" id="{F918A96F-63EF-B5E4-AFC7-F9C694E5CE8B}"/>
+                  </a:ext>
+                </a:extLst>
+              </p:cNvPr>
+              <p:cNvSpPr/>
+              <p:nvPr/>
+            </p:nvSpPr>
+            <p:spPr>
+              <a:xfrm>
+                <a:off x="541538" y="3315814"/>
+                <a:ext cx="2815173" cy="1438182"/>
+              </a:xfrm>
+              <a:prstGeom prst="rect">
+                <a:avLst/>
+              </a:prstGeom>
+              <a:noFill/>
+            </p:spPr>
+            <p:style>
+              <a:lnRef idx="2">
+                <a:schemeClr val="accent1">
+                  <a:shade val="15000"/>
+                </a:schemeClr>
+              </a:lnRef>
+              <a:fillRef idx="1">
+                <a:schemeClr val="accent1"/>
+              </a:fillRef>
+              <a:effectRef idx="0">
+                <a:schemeClr val="accent1"/>
+              </a:effectRef>
+              <a:fontRef idx="minor">
+                <a:schemeClr val="lt1"/>
+              </a:fontRef>
+            </p:style>
+            <p:txBody>
+              <a:bodyPr rtlCol="0" anchor="ctr"/>
+              <a:lstStyle/>
+              <a:p>
+                <a:pPr algn="ctr"/>
+                <a:endParaRPr lang="en-ES"/>
+              </a:p>
+            </p:txBody>
+          </p:sp>
+        </p:grpSp>
+        <p:pic>
+          <p:nvPicPr>
+            <p:cNvPr id="1026" name="Picture 2" descr="Jaime Alejandro Muriel Redondo">
+              <a:extLst>
+                <a:ext uri="{FF2B5EF4-FFF2-40B4-BE49-F238E27FC236}">
+                  <a16:creationId xmlns:a16="http://schemas.microsoft.com/office/drawing/2014/main" id="{0112BF41-9BA5-A522-FAEF-61836D0BE657}"/>
+                </a:ext>
+              </a:extLst>
+            </p:cNvPr>
+            <p:cNvPicPr>
+              <a:picLocks noChangeAspect="1" noChangeArrowheads="1"/>
+            </p:cNvPicPr>
+            <p:nvPr/>
+          </p:nvPicPr>
+          <p:blipFill>
+            <a:blip r:embed="rId6">
+              <a:extLst>
+                <a:ext uri="{28A0092B-C50C-407E-A947-70E740481C1C}">
+                  <a14:useLocalDpi xmlns:a14="http://schemas.microsoft.com/office/drawing/2010/main" val="0"/>
+                </a:ext>
+              </a:extLst>
+            </a:blip>
+            <a:srcRect/>
+            <a:stretch>
+              <a:fillRect/>
+            </a:stretch>
+          </p:blipFill>
+          <p:spPr bwMode="auto">
+            <a:xfrm>
+              <a:off x="533220" y="3429000"/>
+              <a:ext cx="1187852" cy="1187852"/>
+            </a:xfrm>
+            <a:prstGeom prst="rect">
+              <a:avLst/>
+            </a:prstGeom>
+            <a:noFill/>
+            <a:extLst>
+              <a:ext uri="{909E8E84-426E-40DD-AFC4-6F175D3DCCD1}">
+                <a14:hiddenFill xmlns:a14="http://schemas.microsoft.com/office/drawing/2010/main">
+                  <a:solidFill>
+                    <a:srgbClr val="FFFFFF"/>
+                  </a:solidFill>
+                </a14:hiddenFill>
+              </a:ext>
+            </a:extLst>
+          </p:spPr>
+        </p:pic>
+      </p:grpSp>
     </p:spTree>
     <p:extLst>
       <p:ext uri="{BB962C8B-B14F-4D97-AF65-F5344CB8AC3E}">
@@ -5147,7 +5146,7 @@
                                           </p:stCondLst>
                                         </p:cTn>
                                         <p:tgtEl>
-                                          <p:spTgt spid="3"/>
+                                          <p:spTgt spid="6"/>
                                         </p:tgtEl>
                                         <p:attrNameLst>
                                           <p:attrName>style.visibility</p:attrName>
@@ -6107,7 +6106,7 @@
                   <a:latin typeface="Arial" panose="020B0604020202020204" pitchFamily="34" charset="0"/>
                   <a:cs typeface="Arial" panose="020B0604020202020204" pitchFamily="34" charset="0"/>
                 </a:rPr>
-                <a:t>Seminario sobre invasiones concretas (Miquel)</a:t>
+                <a:t>Seminario sobre invasiones concretas (Jaime)</a:t>
               </a:r>
             </a:p>
           </p:txBody>
@@ -6211,7 +6210,7 @@
                   <a:latin typeface="Arial" panose="020B0604020202020204" pitchFamily="34" charset="0"/>
                   <a:cs typeface="Arial" panose="020B0604020202020204" pitchFamily="34" charset="0"/>
                 </a:rPr>
-                <a:t>Preguntas test sobre seminarios (Miquel)</a:t>
+                <a:t>Preguntas test sobre seminarios (Jaime)</a:t>
               </a:r>
             </a:p>
           </p:txBody>

</xml_diff>